<commit_message>
added project details and name
</commit_message>
<xml_diff>
--- a/newssup.pptx
+++ b/newssup.pptx
@@ -308,7 +308,7 @@
           <a:p>
             <a:fld id="{685825BB-8430-4C4D-A9E2-347F048A9FB7}" type="datetimeFigureOut">
               <a:rPr lang="en-US" smtClean="0"/>
-              <a:t>8/14/2012</a:t>
+              <a:t>8/15/2012</a:t>
             </a:fld>
             <a:endParaRPr lang="en-US"/>
           </a:p>
@@ -473,7 +473,7 @@
           <a:p>
             <a:fld id="{685825BB-8430-4C4D-A9E2-347F048A9FB7}" type="datetimeFigureOut">
               <a:rPr lang="en-US" smtClean="0"/>
-              <a:t>8/14/2012</a:t>
+              <a:t>8/15/2012</a:t>
             </a:fld>
             <a:endParaRPr lang="en-US"/>
           </a:p>
@@ -648,7 +648,7 @@
           <a:p>
             <a:fld id="{685825BB-8430-4C4D-A9E2-347F048A9FB7}" type="datetimeFigureOut">
               <a:rPr lang="en-US" smtClean="0"/>
-              <a:t>8/14/2012</a:t>
+              <a:t>8/15/2012</a:t>
             </a:fld>
             <a:endParaRPr lang="en-US"/>
           </a:p>
@@ -813,7 +813,7 @@
           <a:p>
             <a:fld id="{685825BB-8430-4C4D-A9E2-347F048A9FB7}" type="datetimeFigureOut">
               <a:rPr lang="en-US" smtClean="0"/>
-              <a:t>8/14/2012</a:t>
+              <a:t>8/15/2012</a:t>
             </a:fld>
             <a:endParaRPr lang="en-US"/>
           </a:p>
@@ -1054,7 +1054,7 @@
           <a:p>
             <a:fld id="{685825BB-8430-4C4D-A9E2-347F048A9FB7}" type="datetimeFigureOut">
               <a:rPr lang="en-US" smtClean="0"/>
-              <a:t>8/14/2012</a:t>
+              <a:t>8/15/2012</a:t>
             </a:fld>
             <a:endParaRPr lang="en-US"/>
           </a:p>
@@ -1337,7 +1337,7 @@
           <a:p>
             <a:fld id="{685825BB-8430-4C4D-A9E2-347F048A9FB7}" type="datetimeFigureOut">
               <a:rPr lang="en-US" smtClean="0"/>
-              <a:t>8/14/2012</a:t>
+              <a:t>8/15/2012</a:t>
             </a:fld>
             <a:endParaRPr lang="en-US"/>
           </a:p>
@@ -1766,7 +1766,7 @@
           <a:p>
             <a:fld id="{685825BB-8430-4C4D-A9E2-347F048A9FB7}" type="datetimeFigureOut">
               <a:rPr lang="en-US" smtClean="0"/>
-              <a:t>8/14/2012</a:t>
+              <a:t>8/15/2012</a:t>
             </a:fld>
             <a:endParaRPr lang="en-US"/>
           </a:p>
@@ -1879,7 +1879,7 @@
           <a:p>
             <a:fld id="{685825BB-8430-4C4D-A9E2-347F048A9FB7}" type="datetimeFigureOut">
               <a:rPr lang="en-US" smtClean="0"/>
-              <a:t>8/14/2012</a:t>
+              <a:t>8/15/2012</a:t>
             </a:fld>
             <a:endParaRPr lang="en-US"/>
           </a:p>
@@ -1969,7 +1969,7 @@
           <a:p>
             <a:fld id="{685825BB-8430-4C4D-A9E2-347F048A9FB7}" type="datetimeFigureOut">
               <a:rPr lang="en-US" smtClean="0"/>
-              <a:t>8/14/2012</a:t>
+              <a:t>8/15/2012</a:t>
             </a:fld>
             <a:endParaRPr lang="en-US"/>
           </a:p>
@@ -2158,7 +2158,7 @@
           <a:p>
             <a:fld id="{685825BB-8430-4C4D-A9E2-347F048A9FB7}" type="datetimeFigureOut">
               <a:rPr lang="en-US" smtClean="0"/>
-              <a:t>8/14/2012</a:t>
+              <a:t>8/15/2012</a:t>
             </a:fld>
             <a:endParaRPr lang="en-US"/>
           </a:p>
@@ -2476,7 +2476,7 @@
           <a:p>
             <a:fld id="{685825BB-8430-4C4D-A9E2-347F048A9FB7}" type="datetimeFigureOut">
               <a:rPr lang="en-US" smtClean="0"/>
-              <a:t>8/14/2012</a:t>
+              <a:t>8/15/2012</a:t>
             </a:fld>
             <a:endParaRPr lang="en-US"/>
           </a:p>
@@ -2855,7 +2855,7 @@
           <a:p>
             <a:fld id="{685825BB-8430-4C4D-A9E2-347F048A9FB7}" type="datetimeFigureOut">
               <a:rPr lang="en-US" smtClean="0"/>
-              <a:t>8/14/2012</a:t>
+              <a:t>8/15/2012</a:t>
             </a:fld>
             <a:endParaRPr lang="en-US"/>
           </a:p>
@@ -3190,8 +3190,218 @@
         </p:nvSpPr>
         <p:spPr>
           <a:xfrm>
-            <a:off x="838200" y="914400"/>
-            <a:ext cx="7772400" cy="1470025"/>
+            <a:off x="609600" y="533400"/>
+            <a:ext cx="7772400" cy="1851025"/>
+          </a:xfrm>
+        </p:spPr>
+        <p:txBody>
+          <a:bodyPr>
+            <a:normAutofit fontScale="90000"/>
+          </a:bodyPr>
+          <a:lstStyle/>
+          <a:p>
+            <a:pPr>
+              <a:spcBef>
+                <a:spcPct val="20000"/>
+              </a:spcBef>
+              <a:buClr>
+                <a:schemeClr val="accent1"/>
+              </a:buClr>
+            </a:pPr>
+            <a:r>
+              <a:rPr lang="en-US" sz="6000" dirty="0" smtClean="0"/>
+              <a:t/>
+            </a:r>
+            <a:br>
+              <a:rPr lang="en-US" sz="6000" dirty="0" smtClean="0"/>
+            </a:br>
+            <a:r>
+              <a:rPr lang="en-US" sz="6000" dirty="0"/>
+              <a:t/>
+            </a:r>
+            <a:br>
+              <a:rPr lang="en-US" sz="6000" dirty="0"/>
+            </a:br>
+            <a:r>
+              <a:rPr lang="en-US" sz="6000" dirty="0" smtClean="0"/>
+              <a:t/>
+            </a:r>
+            <a:br>
+              <a:rPr lang="en-US" sz="6000" dirty="0" smtClean="0"/>
+            </a:br>
+            <a:r>
+              <a:rPr lang="en-US" sz="6000" dirty="0"/>
+              <a:t/>
+            </a:r>
+            <a:br>
+              <a:rPr lang="en-US" sz="6000" dirty="0"/>
+            </a:br>
+            <a:r>
+              <a:rPr lang="en-US" sz="6000" dirty="0" smtClean="0"/>
+              <a:t/>
+            </a:r>
+            <a:br>
+              <a:rPr lang="en-US" sz="6000" dirty="0" smtClean="0"/>
+            </a:br>
+            <a:r>
+              <a:rPr lang="en-US" sz="6000" dirty="0" err="1" smtClean="0"/>
+              <a:t>Newssup</a:t>
+            </a:r>
+            <a:r>
+              <a:rPr lang="en-US" sz="6000" dirty="0"/>
+              <a:t/>
+            </a:r>
+            <a:br>
+              <a:rPr lang="en-US" sz="6000" dirty="0"/>
+            </a:br>
+            <a:r>
+              <a:rPr lang="en-US" sz="2200" dirty="0" smtClean="0">
+                <a:solidFill>
+                  <a:srgbClr val="0070C0"/>
+                </a:solidFill>
+                <a:latin typeface="+mn-lt"/>
+                <a:ea typeface="+mn-ea"/>
+                <a:cs typeface="+mn-cs"/>
+              </a:rPr>
+              <a:t>Developed by:  </a:t>
+            </a:r>
+            <a:r>
+              <a:rPr lang="en-US" sz="2200" dirty="0" err="1" smtClean="0">
+                <a:solidFill>
+                  <a:srgbClr val="0070C0"/>
+                </a:solidFill>
+                <a:latin typeface="+mn-lt"/>
+                <a:ea typeface="+mn-ea"/>
+                <a:cs typeface="+mn-cs"/>
+              </a:rPr>
+              <a:t>Pratibha</a:t>
+            </a:r>
+            <a:r>
+              <a:rPr lang="en-US" sz="2200" dirty="0" smtClean="0">
+                <a:solidFill>
+                  <a:srgbClr val="0070C0"/>
+                </a:solidFill>
+                <a:latin typeface="+mn-lt"/>
+                <a:ea typeface="+mn-ea"/>
+                <a:cs typeface="+mn-cs"/>
+              </a:rPr>
+              <a:t> </a:t>
+            </a:r>
+            <a:r>
+              <a:rPr lang="en-US" sz="2200" dirty="0" err="1" smtClean="0">
+                <a:solidFill>
+                  <a:srgbClr val="0070C0"/>
+                </a:solidFill>
+                <a:latin typeface="+mn-lt"/>
+                <a:ea typeface="+mn-ea"/>
+                <a:cs typeface="+mn-cs"/>
+              </a:rPr>
+              <a:t>Natani</a:t>
+            </a:r>
+            <a:r>
+              <a:rPr lang="en-US" sz="2200" dirty="0" smtClean="0">
+                <a:solidFill>
+                  <a:srgbClr val="0070C0"/>
+                </a:solidFill>
+                <a:latin typeface="+mn-lt"/>
+                <a:ea typeface="+mn-ea"/>
+                <a:cs typeface="+mn-cs"/>
+              </a:rPr>
+              <a:t>  </a:t>
+            </a:r>
+            <a:br>
+              <a:rPr lang="en-US" sz="2200" dirty="0" smtClean="0">
+                <a:solidFill>
+                  <a:srgbClr val="0070C0"/>
+                </a:solidFill>
+                <a:latin typeface="+mn-lt"/>
+                <a:ea typeface="+mn-ea"/>
+                <a:cs typeface="+mn-cs"/>
+              </a:rPr>
+            </a:br>
+            <a:r>
+              <a:rPr lang="en-US" sz="2200" dirty="0" smtClean="0">
+                <a:solidFill>
+                  <a:srgbClr val="0070C0"/>
+                </a:solidFill>
+                <a:latin typeface="+mn-lt"/>
+                <a:ea typeface="+mn-ea"/>
+                <a:cs typeface="+mn-cs"/>
+              </a:rPr>
+              <a:t>&lt;pnatani@pdx.edu&gt;  / &lt;</a:t>
+            </a:r>
+            <a:r>
+              <a:rPr lang="en-US" sz="2200" dirty="0">
+                <a:solidFill>
+                  <a:srgbClr val="0070C0"/>
+                </a:solidFill>
+                <a:latin typeface="+mn-lt"/>
+                <a:ea typeface="+mn-ea"/>
+                <a:cs typeface="+mn-cs"/>
+              </a:rPr>
+              <a:t>en.pratibha@gmail.com&gt;</a:t>
+            </a:r>
+            <a:br>
+              <a:rPr lang="en-US" sz="2200" dirty="0">
+                <a:solidFill>
+                  <a:srgbClr val="0070C0"/>
+                </a:solidFill>
+                <a:latin typeface="+mn-lt"/>
+                <a:ea typeface="+mn-ea"/>
+                <a:cs typeface="+mn-cs"/>
+              </a:rPr>
+            </a:br>
+            <a:r>
+              <a:rPr lang="en-US" sz="2200" dirty="0">
+                <a:solidFill>
+                  <a:srgbClr val="0070C0"/>
+                </a:solidFill>
+                <a:latin typeface="+mn-lt"/>
+                <a:ea typeface="+mn-ea"/>
+                <a:cs typeface="+mn-cs"/>
+              </a:rPr>
+              <a:t>Powered by Google and BBC News APIs</a:t>
+            </a:r>
+            <a:r>
+              <a:rPr lang="en-US" sz="2200" dirty="0">
+                <a:solidFill>
+                  <a:schemeClr val="tx1">
+                    <a:tint val="75000"/>
+                  </a:schemeClr>
+                </a:solidFill>
+                <a:latin typeface="+mn-lt"/>
+                <a:ea typeface="+mn-ea"/>
+                <a:cs typeface="+mn-cs"/>
+              </a:rPr>
+              <a:t>.</a:t>
+            </a:r>
+            <a:endParaRPr lang="en-US" sz="2200" dirty="0">
+              <a:solidFill>
+                <a:schemeClr val="tx1">
+                  <a:tint val="75000"/>
+                </a:schemeClr>
+              </a:solidFill>
+              <a:latin typeface="+mn-lt"/>
+              <a:ea typeface="+mn-ea"/>
+              <a:cs typeface="+mn-cs"/>
+            </a:endParaRPr>
+          </a:p>
+        </p:txBody>
+      </p:sp>
+      <p:sp>
+        <p:nvSpPr>
+          <p:cNvPr id="3" name="Subtitle 2"/>
+          <p:cNvSpPr>
+            <a:spLocks noGrp="1"/>
+          </p:cNvSpPr>
+          <p:nvPr>
+            <p:ph type="subTitle" idx="1"/>
+          </p:nvPr>
+        </p:nvSpPr>
+        <p:spPr>
+          <a:xfrm>
+            <a:off x="609600" y="2819400"/>
+            <a:ext cx="6400800" cy="3657600"/>
           </a:xfrm>
         </p:spPr>
         <p:txBody>
@@ -3201,36 +3411,6 @@
           <a:lstStyle/>
           <a:p>
             <a:r>
-              <a:rPr lang="en-US" sz="6000" dirty="0" err="1" smtClean="0"/>
-              <a:t>newssup</a:t>
-            </a:r>
-            <a:endParaRPr lang="en-US" sz="6000" dirty="0"/>
-          </a:p>
-        </p:txBody>
-      </p:sp>
-      <p:sp>
-        <p:nvSpPr>
-          <p:cNvPr id="3" name="Subtitle 2"/>
-          <p:cNvSpPr>
-            <a:spLocks noGrp="1"/>
-          </p:cNvSpPr>
-          <p:nvPr>
-            <p:ph type="subTitle" idx="1"/>
-          </p:nvPr>
-        </p:nvSpPr>
-        <p:spPr>
-          <a:xfrm>
-            <a:off x="1600200" y="2667000"/>
-            <a:ext cx="6400800" cy="3657600"/>
-          </a:xfrm>
-        </p:spPr>
-        <p:txBody>
-          <a:bodyPr>
-            <a:normAutofit/>
-          </a:bodyPr>
-          <a:lstStyle/>
-          <a:p>
-            <a:r>
               <a:rPr lang="en-US" dirty="0" smtClean="0"/>
               <a:t>Get the latest </a:t>
             </a:r>
@@ -3252,7 +3432,15 @@
           <a:p>
             <a:r>
               <a:rPr lang="en-US" dirty="0" smtClean="0"/>
-              <a:t>Read and listen to the news updates.</a:t>
+              <a:t>Now you can r</a:t>
+            </a:r>
+            <a:r>
+              <a:rPr lang="en-US" dirty="0" smtClean="0"/>
+              <a:t>ead </a:t>
+            </a:r>
+            <a:r>
+              <a:rPr lang="en-US" dirty="0" smtClean="0"/>
+              <a:t>and listen to the news updates.</a:t>
             </a:r>
           </a:p>
         </p:txBody>
@@ -3311,11 +3499,7 @@
           <a:p>
             <a:r>
               <a:rPr lang="en-US" dirty="0" smtClean="0"/>
-              <a:t>Application </a:t>
-            </a:r>
-            <a:r>
-              <a:rPr lang="en-US" dirty="0" smtClean="0"/>
-              <a:t>Main Screen</a:t>
+              <a:t>Application Main Screen</a:t>
             </a:r>
             <a:endParaRPr lang="en-US" dirty="0"/>
           </a:p>
@@ -3962,17 +4146,27 @@
           <a:p>
             <a:r>
               <a:rPr lang="en-US" dirty="0" smtClean="0"/>
-              <a:t>Add other news providers.</a:t>
-            </a:r>
-          </a:p>
-          <a:p>
+              <a:t>Add other news </a:t>
+            </a:r>
+            <a:r>
+              <a:rPr lang="en-US" dirty="0" smtClean="0"/>
+              <a:t>providers e.g. Yahoo, CNN etc.</a:t>
+            </a:r>
             <a:endParaRPr lang="en-US" dirty="0" smtClean="0"/>
           </a:p>
           <a:p>
+            <a:endParaRPr lang="en-US" dirty="0" smtClean="0"/>
+          </a:p>
+          <a:p>
             <a:r>
               <a:rPr lang="en-US" dirty="0" smtClean="0"/>
-              <a:t>Make the application dynamic</a:t>
-            </a:r>
+              <a:t>Make the application </a:t>
+            </a:r>
+            <a:r>
+              <a:rPr lang="en-US" dirty="0" smtClean="0"/>
+              <a:t>dynamic, user can add APIs of his choice.</a:t>
+            </a:r>
+            <a:endParaRPr lang="en-US" dirty="0" smtClean="0"/>
           </a:p>
           <a:p>
             <a:endParaRPr lang="en-US" dirty="0" smtClean="0"/>

</xml_diff>

<commit_message>
Added user and developer instructions
</commit_message>
<xml_diff>
--- a/newssup.pptx
+++ b/newssup.pptx
@@ -3245,7 +3245,11 @@
             </a:br>
             <a:r>
               <a:rPr lang="en-US" sz="6000" dirty="0" err="1" smtClean="0"/>
-              <a:t>Newssup</a:t>
+              <a:t>n</a:t>
+            </a:r>
+            <a:r>
+              <a:rPr lang="en-US" sz="6000" dirty="0" err="1" smtClean="0"/>
+              <a:t>ewssup</a:t>
             </a:r>
             <a:r>
               <a:rPr lang="en-US" sz="6000" dirty="0"/>
@@ -3375,16 +3379,6 @@
               </a:rPr>
               <a:t>.</a:t>
             </a:r>
-            <a:endParaRPr lang="en-US" sz="2200" dirty="0">
-              <a:solidFill>
-                <a:schemeClr val="tx1">
-                  <a:tint val="75000"/>
-                </a:schemeClr>
-              </a:solidFill>
-              <a:latin typeface="+mn-lt"/>
-              <a:ea typeface="+mn-ea"/>
-              <a:cs typeface="+mn-cs"/>
-            </a:endParaRPr>
           </a:p>
         </p:txBody>
       </p:sp>
@@ -3432,15 +3426,7 @@
           <a:p>
             <a:r>
               <a:rPr lang="en-US" dirty="0" smtClean="0"/>
-              <a:t>Now you can r</a:t>
-            </a:r>
-            <a:r>
-              <a:rPr lang="en-US" dirty="0" smtClean="0"/>
-              <a:t>ead </a:t>
-            </a:r>
-            <a:r>
-              <a:rPr lang="en-US" dirty="0" smtClean="0"/>
-              <a:t>and listen to the news updates.</a:t>
+              <a:t>Now you can read and listen to the news updates.</a:t>
             </a:r>
           </a:p>
         </p:txBody>
@@ -4146,27 +4132,17 @@
           <a:p>
             <a:r>
               <a:rPr lang="en-US" dirty="0" smtClean="0"/>
-              <a:t>Add other news </a:t>
-            </a:r>
+              <a:t>Add other news providers e.g. Yahoo, CNN etc.</a:t>
+            </a:r>
+          </a:p>
+          <a:p>
+            <a:endParaRPr lang="en-US" dirty="0" smtClean="0"/>
+          </a:p>
+          <a:p>
             <a:r>
               <a:rPr lang="en-US" dirty="0" smtClean="0"/>
-              <a:t>providers e.g. Yahoo, CNN etc.</a:t>
-            </a:r>
-            <a:endParaRPr lang="en-US" dirty="0" smtClean="0"/>
-          </a:p>
-          <a:p>
-            <a:endParaRPr lang="en-US" dirty="0" smtClean="0"/>
-          </a:p>
-          <a:p>
-            <a:r>
-              <a:rPr lang="en-US" dirty="0" smtClean="0"/>
-              <a:t>Make the application </a:t>
-            </a:r>
-            <a:r>
-              <a:rPr lang="en-US" dirty="0" smtClean="0"/>
-              <a:t>dynamic, user can add APIs of his choice.</a:t>
-            </a:r>
-            <a:endParaRPr lang="en-US" dirty="0" smtClean="0"/>
+              <a:t>Make the application dynamic, user can add APIs of his choice.</a:t>
+            </a:r>
           </a:p>
           <a:p>
             <a:endParaRPr lang="en-US" dirty="0" smtClean="0"/>

</xml_diff>